<commit_message>
Updated the repository to match my working version
</commit_message>
<xml_diff>
--- a/Slides/ng-intro_2014-10-28.pptx
+++ b/Slides/ng-intro_2014-10-28.pptx
@@ -207,7 +207,7 @@
           <a:p>
             <a:fld id="{79944AAA-ABF9-4959-806A-E89DC5183D08}" type="datetimeFigureOut">
               <a:rPr lang="en-US" smtClean="0"/>
-              <a:t>10/27/2014</a:t>
+              <a:t>10/28/2014</a:t>
             </a:fld>
             <a:endParaRPr lang="en-US"/>
           </a:p>
@@ -2255,7 +2255,7 @@
           <a:p>
             <a:fld id="{915A4E75-564A-4025-99BC-114CF31173C0}" type="datetimeFigureOut">
               <a:rPr lang="en-US" smtClean="0"/>
-              <a:t>10/27/2014</a:t>
+              <a:t>10/28/2014</a:t>
             </a:fld>
             <a:endParaRPr lang="en-US"/>
           </a:p>
@@ -2450,7 +2450,7 @@
           <a:p>
             <a:fld id="{915A4E75-564A-4025-99BC-114CF31173C0}" type="datetimeFigureOut">
               <a:rPr lang="en-US" smtClean="0"/>
-              <a:t>10/27/2014</a:t>
+              <a:t>10/28/2014</a:t>
             </a:fld>
             <a:endParaRPr lang="en-US"/>
           </a:p>
@@ -2645,7 +2645,7 @@
           <a:p>
             <a:fld id="{915A4E75-564A-4025-99BC-114CF31173C0}" type="datetimeFigureOut">
               <a:rPr lang="en-US" smtClean="0"/>
-              <a:t>10/27/2014</a:t>
+              <a:t>10/28/2014</a:t>
             </a:fld>
             <a:endParaRPr lang="en-US"/>
           </a:p>
@@ -2840,7 +2840,7 @@
           <a:p>
             <a:fld id="{915A4E75-564A-4025-99BC-114CF31173C0}" type="datetimeFigureOut">
               <a:rPr lang="en-US" smtClean="0"/>
-              <a:t>10/27/2014</a:t>
+              <a:t>10/28/2014</a:t>
             </a:fld>
             <a:endParaRPr lang="en-US"/>
           </a:p>
@@ -3101,7 +3101,7 @@
           <a:p>
             <a:fld id="{915A4E75-564A-4025-99BC-114CF31173C0}" type="datetimeFigureOut">
               <a:rPr lang="en-US" smtClean="0"/>
-              <a:t>10/27/2014</a:t>
+              <a:t>10/28/2014</a:t>
             </a:fld>
             <a:endParaRPr lang="en-US"/>
           </a:p>
@@ -3356,7 +3356,7 @@
           <a:p>
             <a:fld id="{915A4E75-564A-4025-99BC-114CF31173C0}" type="datetimeFigureOut">
               <a:rPr lang="en-US" smtClean="0"/>
-              <a:t>10/27/2014</a:t>
+              <a:t>10/28/2014</a:t>
             </a:fld>
             <a:endParaRPr lang="en-US"/>
           </a:p>
@@ -3747,7 +3747,7 @@
           <a:p>
             <a:fld id="{915A4E75-564A-4025-99BC-114CF31173C0}" type="datetimeFigureOut">
               <a:rPr lang="en-US" smtClean="0"/>
-              <a:t>10/27/2014</a:t>
+              <a:t>10/28/2014</a:t>
             </a:fld>
             <a:endParaRPr lang="en-US"/>
           </a:p>
@@ -3882,7 +3882,7 @@
           <a:p>
             <a:fld id="{915A4E75-564A-4025-99BC-114CF31173C0}" type="datetimeFigureOut">
               <a:rPr lang="en-US" smtClean="0"/>
-              <a:t>10/27/2014</a:t>
+              <a:t>10/28/2014</a:t>
             </a:fld>
             <a:endParaRPr lang="en-US"/>
           </a:p>
@@ -3986,7 +3986,7 @@
           <a:p>
             <a:fld id="{915A4E75-564A-4025-99BC-114CF31173C0}" type="datetimeFigureOut">
               <a:rPr lang="en-US" smtClean="0"/>
-              <a:t>10/27/2014</a:t>
+              <a:t>10/28/2014</a:t>
             </a:fld>
             <a:endParaRPr lang="en-US"/>
           </a:p>
@@ -4281,7 +4281,7 @@
           <a:p>
             <a:fld id="{915A4E75-564A-4025-99BC-114CF31173C0}" type="datetimeFigureOut">
               <a:rPr lang="en-US" smtClean="0"/>
-              <a:t>10/27/2014</a:t>
+              <a:t>10/28/2014</a:t>
             </a:fld>
             <a:endParaRPr lang="en-US"/>
           </a:p>
@@ -4552,7 +4552,7 @@
           <a:p>
             <a:fld id="{915A4E75-564A-4025-99BC-114CF31173C0}" type="datetimeFigureOut">
               <a:rPr lang="en-US" smtClean="0"/>
-              <a:t>10/27/2014</a:t>
+              <a:t>10/28/2014</a:t>
             </a:fld>
             <a:endParaRPr lang="en-US"/>
           </a:p>
@@ -9786,7 +9786,7 @@
                 <a:latin typeface="Arial" panose="020B0604020202020204" pitchFamily="34" charset="0"/>
                 <a:cs typeface="Arial" panose="020B0604020202020204" pitchFamily="34" charset="0"/>
               </a:rPr>
-              <a:t>ngShow</a:t>
+              <a:t>ngController</a:t>
             </a:r>
             <a:r>
               <a:rPr lang="en-US" sz="2400" dirty="0" smtClean="0">
@@ -9799,10 +9799,10 @@
                 <a:latin typeface="Arial" panose="020B0604020202020204" pitchFamily="34" charset="0"/>
                 <a:cs typeface="Arial" panose="020B0604020202020204" pitchFamily="34" charset="0"/>
               </a:rPr>
-              <a:t> – Show a DOM element if the expression is </a:t>
-            </a:r>
-            <a:r>
-              <a:rPr lang="en-US" sz="2400" dirty="0" err="1" smtClean="0">
+              <a:t> </a:t>
+            </a:r>
+            <a:r>
+              <a:rPr lang="en-US" sz="2400" dirty="0">
                 <a:solidFill>
                   <a:schemeClr val="tx1">
                     <a:lumMod val="85000"/>
@@ -9812,9 +9812,160 @@
                 <a:latin typeface="Arial" panose="020B0604020202020204" pitchFamily="34" charset="0"/>
                 <a:cs typeface="Arial" panose="020B0604020202020204" pitchFamily="34" charset="0"/>
               </a:rPr>
+              <a:t>– Attaches controller to the view at element</a:t>
+            </a:r>
+          </a:p>
+          <a:p>
+            <a:pPr marL="342900" indent="-342900">
+              <a:buSzPct val="90000"/>
+              <a:buFont typeface="Arial" panose="020B0604020202020204" pitchFamily="34" charset="0"/>
+              <a:buChar char="•"/>
+            </a:pPr>
+            <a:r>
+              <a:rPr lang="en-US" sz="2400" dirty="0" err="1">
+                <a:solidFill>
+                  <a:schemeClr val="tx1">
+                    <a:lumMod val="85000"/>
+                    <a:lumOff val="15000"/>
+                  </a:schemeClr>
+                </a:solidFill>
+                <a:latin typeface="Arial" panose="020B0604020202020204" pitchFamily="34" charset="0"/>
+                <a:cs typeface="Arial" panose="020B0604020202020204" pitchFamily="34" charset="0"/>
+              </a:rPr>
+              <a:t>ngClick</a:t>
+            </a:r>
+            <a:r>
+              <a:rPr lang="en-US" sz="2400" dirty="0">
+                <a:solidFill>
+                  <a:schemeClr val="tx1">
+                    <a:lumMod val="85000"/>
+                    <a:lumOff val="15000"/>
+                  </a:schemeClr>
+                </a:solidFill>
+                <a:latin typeface="Arial" panose="020B0604020202020204" pitchFamily="34" charset="0"/>
+                <a:cs typeface="Arial" panose="020B0604020202020204" pitchFamily="34" charset="0"/>
+              </a:rPr>
+              <a:t> – binds function to click event of DOM element</a:t>
+            </a:r>
+          </a:p>
+          <a:p>
+            <a:pPr marL="342900" indent="-342900">
+              <a:buSzPct val="90000"/>
+              <a:buFont typeface="Arial" panose="020B0604020202020204" pitchFamily="34" charset="0"/>
+              <a:buChar char="•"/>
+            </a:pPr>
+            <a:r>
+              <a:rPr lang="en-US" sz="2400" dirty="0" err="1">
+                <a:solidFill>
+                  <a:schemeClr val="tx1">
+                    <a:lumMod val="85000"/>
+                    <a:lumOff val="15000"/>
+                  </a:schemeClr>
+                </a:solidFill>
+                <a:latin typeface="Arial" panose="020B0604020202020204" pitchFamily="34" charset="0"/>
+                <a:cs typeface="Arial" panose="020B0604020202020204" pitchFamily="34" charset="0"/>
+              </a:rPr>
+              <a:t>ngView</a:t>
+            </a:r>
+            <a:r>
+              <a:rPr lang="en-US" sz="2400" dirty="0">
+                <a:solidFill>
+                  <a:schemeClr val="tx1">
+                    <a:lumMod val="85000"/>
+                    <a:lumOff val="15000"/>
+                  </a:schemeClr>
+                </a:solidFill>
+                <a:latin typeface="Arial" panose="020B0604020202020204" pitchFamily="34" charset="0"/>
+                <a:cs typeface="Arial" panose="020B0604020202020204" pitchFamily="34" charset="0"/>
+              </a:rPr>
+              <a:t> – Place holder for templates ($route and </a:t>
+            </a:r>
+            <a:r>
+              <a:rPr lang="en-US" sz="2400" dirty="0" err="1">
+                <a:solidFill>
+                  <a:schemeClr val="tx1">
+                    <a:lumMod val="85000"/>
+                    <a:lumOff val="15000"/>
+                  </a:schemeClr>
+                </a:solidFill>
+                <a:latin typeface="Arial" panose="020B0604020202020204" pitchFamily="34" charset="0"/>
+                <a:cs typeface="Arial" panose="020B0604020202020204" pitchFamily="34" charset="0"/>
+              </a:rPr>
+              <a:t>ngRoute</a:t>
+            </a:r>
+            <a:r>
+              <a:rPr lang="en-US" sz="2400" dirty="0">
+                <a:solidFill>
+                  <a:schemeClr val="tx1">
+                    <a:lumMod val="85000"/>
+                    <a:lumOff val="15000"/>
+                  </a:schemeClr>
+                </a:solidFill>
+                <a:latin typeface="Arial" panose="020B0604020202020204" pitchFamily="34" charset="0"/>
+                <a:cs typeface="Arial" panose="020B0604020202020204" pitchFamily="34" charset="0"/>
+              </a:rPr>
+              <a:t> required)</a:t>
+            </a:r>
+          </a:p>
+          <a:p>
+            <a:pPr marL="342900" indent="-342900">
+              <a:buSzPct val="90000"/>
+              <a:buFont typeface="Arial" panose="020B0604020202020204" pitchFamily="34" charset="0"/>
+              <a:buChar char="•"/>
+            </a:pPr>
+            <a:r>
+              <a:rPr lang="en-US" sz="2400" dirty="0" err="1" smtClean="0">
+                <a:solidFill>
+                  <a:schemeClr val="tx1">
+                    <a:lumMod val="85000"/>
+                    <a:lumOff val="15000"/>
+                  </a:schemeClr>
+                </a:solidFill>
+                <a:latin typeface="Arial" panose="020B0604020202020204" pitchFamily="34" charset="0"/>
+                <a:cs typeface="Arial" panose="020B0604020202020204" pitchFamily="34" charset="0"/>
+              </a:rPr>
+              <a:t>ngHide</a:t>
+            </a:r>
+            <a:r>
+              <a:rPr lang="en-US" sz="2400" dirty="0" smtClean="0">
+                <a:solidFill>
+                  <a:schemeClr val="tx1">
+                    <a:lumMod val="85000"/>
+                    <a:lumOff val="15000"/>
+                  </a:schemeClr>
+                </a:solidFill>
+                <a:latin typeface="Arial" panose="020B0604020202020204" pitchFamily="34" charset="0"/>
+                <a:cs typeface="Arial" panose="020B0604020202020204" pitchFamily="34" charset="0"/>
+              </a:rPr>
+              <a:t> </a:t>
+            </a:r>
+            <a:r>
+              <a:rPr lang="en-US" sz="2400" dirty="0" smtClean="0">
+                <a:solidFill>
+                  <a:schemeClr val="tx1">
+                    <a:lumMod val="85000"/>
+                    <a:lumOff val="15000"/>
+                  </a:schemeClr>
+                </a:solidFill>
+                <a:latin typeface="Arial" panose="020B0604020202020204" pitchFamily="34" charset="0"/>
+                <a:cs typeface="Arial" panose="020B0604020202020204" pitchFamily="34" charset="0"/>
+              </a:rPr>
+              <a:t>– Hide the DOM element if the expression is </a:t>
+            </a:r>
+            <a:r>
+              <a:rPr lang="en-US" sz="2400" dirty="0" err="1" smtClean="0">
+                <a:solidFill>
+                  <a:schemeClr val="tx1">
+                    <a:lumMod val="85000"/>
+                    <a:lumOff val="15000"/>
+                  </a:schemeClr>
+                </a:solidFill>
+                <a:latin typeface="Arial" panose="020B0604020202020204" pitchFamily="34" charset="0"/>
+                <a:cs typeface="Arial" panose="020B0604020202020204" pitchFamily="34" charset="0"/>
+              </a:rPr>
               <a:t>truthy</a:t>
             </a:r>
-            <a:endParaRPr lang="en-US" sz="2400" dirty="0">
+            <a:endParaRPr lang="en-US" sz="2400" dirty="0" smtClean="0">
               <a:solidFill>
                 <a:schemeClr val="tx1">
                   <a:lumMod val="85000"/>
@@ -9832,7 +9983,7 @@
               <a:buChar char="•"/>
             </a:pPr>
             <a:r>
-              <a:rPr lang="en-US" sz="2400" dirty="0" err="1" smtClean="0">
+              <a:rPr lang="en-US" sz="2400" dirty="0" err="1">
                 <a:solidFill>
                   <a:schemeClr val="tx1">
                     <a:lumMod val="85000"/>
@@ -9842,10 +9993,10 @@
                 <a:latin typeface="Arial" panose="020B0604020202020204" pitchFamily="34" charset="0"/>
                 <a:cs typeface="Arial" panose="020B0604020202020204" pitchFamily="34" charset="0"/>
               </a:rPr>
-              <a:t>ngHide</a:t>
-            </a:r>
-            <a:r>
-              <a:rPr lang="en-US" sz="2400" dirty="0" smtClean="0">
+              <a:t>ngShow</a:t>
+            </a:r>
+            <a:r>
+              <a:rPr lang="en-US" sz="2400" dirty="0">
                 <a:solidFill>
                   <a:schemeClr val="tx1">
                     <a:lumMod val="85000"/>
@@ -9855,7 +10006,7 @@
                 <a:latin typeface="Arial" panose="020B0604020202020204" pitchFamily="34" charset="0"/>
                 <a:cs typeface="Arial" panose="020B0604020202020204" pitchFamily="34" charset="0"/>
               </a:rPr>
-              <a:t> – Hide the DOM element if the expression is </a:t>
+              <a:t> – Show a DOM element if the expression is </a:t>
             </a:r>
             <a:r>
               <a:rPr lang="en-US" sz="2400" dirty="0" err="1" smtClean="0">
@@ -9877,155 +10028,6 @@
                   <a:lumOff val="15000"/>
                 </a:schemeClr>
               </a:solidFill>
-              <a:latin typeface="Arial" panose="020B0604020202020204" pitchFamily="34" charset="0"/>
-              <a:cs typeface="Arial" panose="020B0604020202020204" pitchFamily="34" charset="0"/>
-            </a:endParaRPr>
-          </a:p>
-          <a:p>
-            <a:pPr marL="342900" indent="-342900">
-              <a:buSzPct val="90000"/>
-              <a:buFont typeface="Arial" panose="020B0604020202020204" pitchFamily="34" charset="0"/>
-              <a:buChar char="•"/>
-            </a:pPr>
-            <a:r>
-              <a:rPr lang="en-US" sz="2400" dirty="0" err="1" smtClean="0">
-                <a:solidFill>
-                  <a:schemeClr val="tx1">
-                    <a:lumMod val="85000"/>
-                    <a:lumOff val="15000"/>
-                  </a:schemeClr>
-                </a:solidFill>
-                <a:latin typeface="Arial" panose="020B0604020202020204" pitchFamily="34" charset="0"/>
-                <a:cs typeface="Arial" panose="020B0604020202020204" pitchFamily="34" charset="0"/>
-              </a:rPr>
-              <a:t>ngView</a:t>
-            </a:r>
-            <a:r>
-              <a:rPr lang="en-US" sz="2400" dirty="0" smtClean="0">
-                <a:solidFill>
-                  <a:schemeClr val="tx1">
-                    <a:lumMod val="85000"/>
-                    <a:lumOff val="15000"/>
-                  </a:schemeClr>
-                </a:solidFill>
-                <a:latin typeface="Arial" panose="020B0604020202020204" pitchFamily="34" charset="0"/>
-                <a:cs typeface="Arial" panose="020B0604020202020204" pitchFamily="34" charset="0"/>
-              </a:rPr>
-              <a:t> – Place holder for templates ($route and </a:t>
-            </a:r>
-            <a:r>
-              <a:rPr lang="en-US" sz="2400" dirty="0" err="1" smtClean="0">
-                <a:solidFill>
-                  <a:schemeClr val="tx1">
-                    <a:lumMod val="85000"/>
-                    <a:lumOff val="15000"/>
-                  </a:schemeClr>
-                </a:solidFill>
-                <a:latin typeface="Arial" panose="020B0604020202020204" pitchFamily="34" charset="0"/>
-                <a:cs typeface="Arial" panose="020B0604020202020204" pitchFamily="34" charset="0"/>
-              </a:rPr>
-              <a:t>ngRoute</a:t>
-            </a:r>
-            <a:r>
-              <a:rPr lang="en-US" sz="2400" dirty="0" smtClean="0">
-                <a:solidFill>
-                  <a:schemeClr val="tx1">
-                    <a:lumMod val="85000"/>
-                    <a:lumOff val="15000"/>
-                  </a:schemeClr>
-                </a:solidFill>
-                <a:latin typeface="Arial" panose="020B0604020202020204" pitchFamily="34" charset="0"/>
-                <a:cs typeface="Arial" panose="020B0604020202020204" pitchFamily="34" charset="0"/>
-              </a:rPr>
-              <a:t> required)</a:t>
-            </a:r>
-            <a:endParaRPr lang="en-US" sz="2400" dirty="0">
-              <a:solidFill>
-                <a:schemeClr val="tx1">
-                  <a:lumMod val="85000"/>
-                  <a:lumOff val="15000"/>
-                </a:schemeClr>
-              </a:solidFill>
-              <a:latin typeface="Arial" panose="020B0604020202020204" pitchFamily="34" charset="0"/>
-              <a:cs typeface="Arial" panose="020B0604020202020204" pitchFamily="34" charset="0"/>
-            </a:endParaRPr>
-          </a:p>
-          <a:p>
-            <a:pPr marL="342900" indent="-342900">
-              <a:buSzPct val="90000"/>
-              <a:buFont typeface="Arial" panose="020B0604020202020204" pitchFamily="34" charset="0"/>
-              <a:buChar char="•"/>
-            </a:pPr>
-            <a:r>
-              <a:rPr lang="en-US" sz="2400" dirty="0" err="1" smtClean="0">
-                <a:solidFill>
-                  <a:schemeClr val="tx1">
-                    <a:lumMod val="85000"/>
-                    <a:lumOff val="15000"/>
-                  </a:schemeClr>
-                </a:solidFill>
-                <a:latin typeface="Arial" panose="020B0604020202020204" pitchFamily="34" charset="0"/>
-                <a:cs typeface="Arial" panose="020B0604020202020204" pitchFamily="34" charset="0"/>
-              </a:rPr>
-              <a:t>ngController</a:t>
-            </a:r>
-            <a:r>
-              <a:rPr lang="en-US" sz="2400" dirty="0" smtClean="0">
-                <a:solidFill>
-                  <a:schemeClr val="tx1">
-                    <a:lumMod val="85000"/>
-                    <a:lumOff val="15000"/>
-                  </a:schemeClr>
-                </a:solidFill>
-                <a:latin typeface="Arial" panose="020B0604020202020204" pitchFamily="34" charset="0"/>
-                <a:cs typeface="Arial" panose="020B0604020202020204" pitchFamily="34" charset="0"/>
-              </a:rPr>
-              <a:t> – Attaches controller to the view at element</a:t>
-            </a:r>
-            <a:endParaRPr lang="en-US" sz="2400" dirty="0">
-              <a:solidFill>
-                <a:schemeClr val="tx1">
-                  <a:lumMod val="85000"/>
-                  <a:lumOff val="15000"/>
-                </a:schemeClr>
-              </a:solidFill>
-              <a:latin typeface="Arial" panose="020B0604020202020204" pitchFamily="34" charset="0"/>
-              <a:cs typeface="Arial" panose="020B0604020202020204" pitchFamily="34" charset="0"/>
-            </a:endParaRPr>
-          </a:p>
-          <a:p>
-            <a:pPr marL="342900" indent="-342900">
-              <a:buSzPct val="90000"/>
-              <a:buFont typeface="Arial" panose="020B0604020202020204" pitchFamily="34" charset="0"/>
-              <a:buChar char="•"/>
-            </a:pPr>
-            <a:r>
-              <a:rPr lang="en-US" sz="2400" dirty="0" err="1" smtClean="0">
-                <a:solidFill>
-                  <a:schemeClr val="tx1">
-                    <a:lumMod val="85000"/>
-                    <a:lumOff val="15000"/>
-                  </a:schemeClr>
-                </a:solidFill>
-                <a:latin typeface="Arial" panose="020B0604020202020204" pitchFamily="34" charset="0"/>
-                <a:cs typeface="Arial" panose="020B0604020202020204" pitchFamily="34" charset="0"/>
-              </a:rPr>
-              <a:t>ngClick</a:t>
-            </a:r>
-            <a:r>
-              <a:rPr lang="en-US" sz="2400" dirty="0" smtClean="0">
-                <a:solidFill>
-                  <a:schemeClr val="tx1">
-                    <a:lumMod val="85000"/>
-                    <a:lumOff val="15000"/>
-                  </a:schemeClr>
-                </a:solidFill>
-                <a:latin typeface="Arial" panose="020B0604020202020204" pitchFamily="34" charset="0"/>
-                <a:cs typeface="Arial" panose="020B0604020202020204" pitchFamily="34" charset="0"/>
-              </a:rPr>
-              <a:t> – binds function to click event of DOM element</a:t>
-            </a:r>
-            <a:endParaRPr lang="en-US" sz="2400" dirty="0" smtClean="0">
               <a:latin typeface="Arial" panose="020B0604020202020204" pitchFamily="34" charset="0"/>
               <a:cs typeface="Arial" panose="020B0604020202020204" pitchFamily="34" charset="0"/>
             </a:endParaRPr>

</xml_diff>